<commit_message>
fix text.size() and update PPT
</commit_message>
<xml_diff>
--- a/document/Z-Language.pptx
+++ b/document/Z-Language.pptx
@@ -10,6 +10,7 @@
     <p:sldId id="258" r:id="rId4"/>
     <p:sldId id="259" r:id="rId5"/>
     <p:sldId id="260" r:id="rId6"/>
+    <p:sldId id="261" r:id="rId7"/>
   </p:sldIdLst>
   <p:sldSz cx="9144000" cy="6858000" type="screen4x3"/>
   <p:notesSz cx="6858000" cy="9144000"/>
@@ -292,7 +293,7 @@
           <a:p>
             <a:fld id="{6BFECD78-3C8E-49F2-8FAB-59489D168ABB}" type="datetimeFigureOut">
               <a:rPr lang="en-US" smtClean="0"/>
-              <a:t>15/12/23</a:t>
+              <a:t>15/12/28</a:t>
             </a:fld>
             <a:endParaRPr lang="en-US"/>
           </a:p>
@@ -462,7 +463,7 @@
           <a:p>
             <a:fld id="{6BFECD78-3C8E-49F2-8FAB-59489D168ABB}" type="datetimeFigureOut">
               <a:rPr lang="en-US" smtClean="0"/>
-              <a:t>15/12/23</a:t>
+              <a:t>15/12/28</a:t>
             </a:fld>
             <a:endParaRPr lang="en-US"/>
           </a:p>
@@ -642,7 +643,7 @@
           <a:p>
             <a:fld id="{6BFECD78-3C8E-49F2-8FAB-59489D168ABB}" type="datetimeFigureOut">
               <a:rPr lang="en-US" smtClean="0"/>
-              <a:t>15/12/23</a:t>
+              <a:t>15/12/28</a:t>
             </a:fld>
             <a:endParaRPr lang="en-US"/>
           </a:p>
@@ -812,7 +813,7 @@
           <a:p>
             <a:fld id="{6BFECD78-3C8E-49F2-8FAB-59489D168ABB}" type="datetimeFigureOut">
               <a:rPr lang="en-US" smtClean="0"/>
-              <a:t>15/12/23</a:t>
+              <a:t>15/12/28</a:t>
             </a:fld>
             <a:endParaRPr lang="en-US"/>
           </a:p>
@@ -1058,7 +1059,7 @@
           <a:p>
             <a:fld id="{6BFECD78-3C8E-49F2-8FAB-59489D168ABB}" type="datetimeFigureOut">
               <a:rPr lang="en-US" smtClean="0"/>
-              <a:t>15/12/23</a:t>
+              <a:t>15/12/28</a:t>
             </a:fld>
             <a:endParaRPr lang="en-US"/>
           </a:p>
@@ -1346,7 +1347,7 @@
           <a:p>
             <a:fld id="{6BFECD78-3C8E-49F2-8FAB-59489D168ABB}" type="datetimeFigureOut">
               <a:rPr lang="en-US" smtClean="0"/>
-              <a:t>15/12/23</a:t>
+              <a:t>15/12/28</a:t>
             </a:fld>
             <a:endParaRPr lang="en-US"/>
           </a:p>
@@ -1768,7 +1769,7 @@
           <a:p>
             <a:fld id="{6BFECD78-3C8E-49F2-8FAB-59489D168ABB}" type="datetimeFigureOut">
               <a:rPr lang="en-US" smtClean="0"/>
-              <a:t>15/12/23</a:t>
+              <a:t>15/12/28</a:t>
             </a:fld>
             <a:endParaRPr lang="en-US"/>
           </a:p>
@@ -1886,7 +1887,7 @@
           <a:p>
             <a:fld id="{6BFECD78-3C8E-49F2-8FAB-59489D168ABB}" type="datetimeFigureOut">
               <a:rPr lang="en-US" smtClean="0"/>
-              <a:t>15/12/23</a:t>
+              <a:t>15/12/28</a:t>
             </a:fld>
             <a:endParaRPr lang="en-US"/>
           </a:p>
@@ -1981,7 +1982,7 @@
           <a:p>
             <a:fld id="{6BFECD78-3C8E-49F2-8FAB-59489D168ABB}" type="datetimeFigureOut">
               <a:rPr lang="en-US" smtClean="0"/>
-              <a:t>15/12/23</a:t>
+              <a:t>15/12/28</a:t>
             </a:fld>
             <a:endParaRPr lang="en-US"/>
           </a:p>
@@ -2258,7 +2259,7 @@
           <a:p>
             <a:fld id="{6BFECD78-3C8E-49F2-8FAB-59489D168ABB}" type="datetimeFigureOut">
               <a:rPr lang="en-US" smtClean="0"/>
-              <a:t>15/12/23</a:t>
+              <a:t>15/12/28</a:t>
             </a:fld>
             <a:endParaRPr lang="en-US"/>
           </a:p>
@@ -2515,7 +2516,7 @@
           <a:p>
             <a:fld id="{6BFECD78-3C8E-49F2-8FAB-59489D168ABB}" type="datetimeFigureOut">
               <a:rPr lang="en-US" smtClean="0"/>
-              <a:t>15/12/23</a:t>
+              <a:t>15/12/28</a:t>
             </a:fld>
             <a:endParaRPr lang="en-US"/>
           </a:p>
@@ -2728,7 +2729,7 @@
           <a:p>
             <a:fld id="{6BFECD78-3C8E-49F2-8FAB-59489D168ABB}" type="datetimeFigureOut">
               <a:rPr lang="en-US" smtClean="0"/>
-              <a:t>15/12/23</a:t>
+              <a:t>15/12/28</a:t>
             </a:fld>
             <a:endParaRPr lang="en-US"/>
           </a:p>
@@ -3200,6 +3201,13 @@
   <p:clrMapOvr>
     <a:masterClrMapping/>
   </p:clrMapOvr>
+  <p:timing>
+    <p:tnLst>
+      <p:par>
+        <p:cTn xmlns:p14="http://schemas.microsoft.com/office/powerpoint/2010/main" id="1" dur="indefinite" restart="never" nodeType="tmRoot"/>
+      </p:par>
+    </p:tnLst>
+  </p:timing>
 </p:sld>
 </file>
 
@@ -3303,6 +3311,13 @@
   <p:clrMapOvr>
     <a:masterClrMapping/>
   </p:clrMapOvr>
+  <p:timing>
+    <p:tnLst>
+      <p:par>
+        <p:cTn xmlns:p14="http://schemas.microsoft.com/office/powerpoint/2010/main" id="1" dur="indefinite" restart="never" nodeType="tmRoot"/>
+      </p:par>
+    </p:tnLst>
+  </p:timing>
 </p:sld>
 </file>
 
@@ -3365,7 +3380,6 @@
               <a:rPr kumimoji="1" lang="en-US" altLang="zh-TW" dirty="0" smtClean="0"/>
               <a:t>Goal</a:t>
             </a:r>
-            <a:endParaRPr kumimoji="1" lang="en-US" altLang="zh-TW" dirty="0" smtClean="0"/>
           </a:p>
           <a:p>
             <a:pPr lvl="1"/>
@@ -3373,7 +3387,6 @@
               <a:rPr kumimoji="1" lang="en-US" altLang="zh-TW" dirty="0" smtClean="0"/>
               <a:t>Generate a webpage with simple function</a:t>
             </a:r>
-            <a:endParaRPr kumimoji="1" lang="en-US" altLang="zh-TW" dirty="0" smtClean="0"/>
           </a:p>
           <a:p>
             <a:pPr lvl="1"/>
@@ -3389,7 +3402,6 @@
               <a:rPr kumimoji="1" lang="en-US" altLang="zh-TW" dirty="0" smtClean="0"/>
               <a:t>Common programming style</a:t>
             </a:r>
-            <a:endParaRPr kumimoji="1" lang="en-US" altLang="zh-TW" dirty="0" smtClean="0"/>
           </a:p>
         </p:txBody>
       </p:sp>
@@ -3403,6 +3415,13 @@
   <p:clrMapOvr>
     <a:masterClrMapping/>
   </p:clrMapOvr>
+  <p:timing>
+    <p:tnLst>
+      <p:par>
+        <p:cTn xmlns:p14="http://schemas.microsoft.com/office/powerpoint/2010/main" id="1" dur="indefinite" restart="never" nodeType="tmRoot"/>
+      </p:par>
+    </p:tnLst>
+  </p:timing>
 </p:sld>
 </file>
 
@@ -3468,48 +3487,55 @@
                 <a:latin typeface="Menlo Regular"/>
                 <a:cs typeface="Menlo Regular"/>
               </a:rPr>
-              <a:t>text(String _</a:t>
+              <a:t>t</a:t>
+            </a:r>
+            <a:r>
+              <a:rPr kumimoji="1" lang="en-US" altLang="zh-TW" sz="2000" dirty="0" smtClean="0">
+                <a:latin typeface="Menlo Regular"/>
+                <a:cs typeface="Menlo Regular"/>
+              </a:rPr>
+              <a:t>ext(_</a:t>
+            </a:r>
+            <a:r>
+              <a:rPr kumimoji="1" lang="en-US" altLang="zh-TW" sz="2000" dirty="0" err="1" smtClean="0">
+                <a:latin typeface="Menlo Regular"/>
+                <a:cs typeface="Menlo Regular"/>
+              </a:rPr>
+              <a:t>str</a:t>
+            </a:r>
+            <a:r>
+              <a:rPr kumimoji="1" lang="en-US" altLang="zh-TW" sz="2000" dirty="0" smtClean="0">
+                <a:latin typeface="Menlo Regular"/>
+                <a:cs typeface="Menlo Regular"/>
+              </a:rPr>
+              <a:t>)</a:t>
+            </a:r>
+          </a:p>
+          <a:p>
+            <a:pPr lvl="1"/>
+            <a:r>
+              <a:rPr kumimoji="1" lang="en-US" altLang="zh-TW" sz="2000" dirty="0">
+                <a:latin typeface="Menlo Regular"/>
+                <a:cs typeface="Menlo Regular"/>
+              </a:rPr>
+              <a:t>.</a:t>
             </a:r>
             <a:r>
               <a:rPr kumimoji="1" lang="en-US" altLang="zh-TW" sz="2000" dirty="0" err="1">
                 <a:latin typeface="Menlo Regular"/>
                 <a:cs typeface="Menlo Regular"/>
               </a:rPr>
-              <a:t>str</a:t>
+              <a:t>url</a:t>
             </a:r>
             <a:r>
               <a:rPr kumimoji="1" lang="en-US" altLang="zh-TW" sz="2000" dirty="0" smtClean="0">
                 <a:latin typeface="Menlo Regular"/>
                 <a:cs typeface="Menlo Regular"/>
               </a:rPr>
-              <a:t>)</a:t>
-            </a:r>
-          </a:p>
-          <a:p>
-            <a:pPr lvl="1"/>
-            <a:r>
-              <a:rPr kumimoji="1" lang="en-US" altLang="zh-TW" sz="2000" dirty="0">
-                <a:latin typeface="Menlo Regular"/>
-                <a:cs typeface="Menlo Regular"/>
-              </a:rPr>
-              <a:t>.</a:t>
-            </a:r>
-            <a:r>
-              <a:rPr kumimoji="1" lang="en-US" altLang="zh-TW" sz="2000" dirty="0" err="1">
-                <a:latin typeface="Menlo Regular"/>
-                <a:cs typeface="Menlo Regular"/>
-              </a:rPr>
-              <a:t>url</a:t>
-            </a:r>
-            <a:r>
-              <a:rPr kumimoji="1" lang="en-US" altLang="zh-TW" sz="2000" dirty="0">
-                <a:latin typeface="Menlo Regular"/>
-                <a:cs typeface="Menlo Regular"/>
-              </a:rPr>
-              <a:t>(String _</a:t>
-            </a:r>
-            <a:r>
-              <a:rPr kumimoji="1" lang="en-US" altLang="zh-TW" sz="2000" dirty="0" err="1">
+              <a:t>(_</a:t>
+            </a:r>
+            <a:r>
+              <a:rPr kumimoji="1" lang="en-US" altLang="zh-TW" sz="2000" dirty="0" err="1" smtClean="0">
                 <a:latin typeface="Menlo Regular"/>
                 <a:cs typeface="Menlo Regular"/>
               </a:rPr>
@@ -3534,21 +3560,21 @@
                 <a:latin typeface="Menlo Regular"/>
                 <a:cs typeface="Menlo Regular"/>
               </a:rPr>
-              <a:t>.size(</a:t>
-            </a:r>
-            <a:r>
-              <a:rPr kumimoji="1" lang="en-US" altLang="zh-TW" sz="2000" dirty="0" err="1">
-                <a:latin typeface="Menlo Regular"/>
-                <a:cs typeface="Menlo Regular"/>
-              </a:rPr>
-              <a:t>int</a:t>
+              <a:t>.size</a:t>
+            </a:r>
+            <a:r>
+              <a:rPr kumimoji="1" lang="en-US" altLang="zh-TW" sz="2000" dirty="0" smtClean="0">
+                <a:latin typeface="Menlo Regular"/>
+                <a:cs typeface="Menlo Regular"/>
+              </a:rPr>
+              <a:t>(_size</a:t>
             </a:r>
             <a:r>
               <a:rPr kumimoji="1" lang="en-US" altLang="zh-TW" sz="2000" dirty="0">
                 <a:latin typeface="Menlo Regular"/>
                 <a:cs typeface="Menlo Regular"/>
               </a:rPr>
-              <a:t> _size) </a:t>
+              <a:t>) </a:t>
             </a:r>
             <a:endParaRPr kumimoji="1" lang="en-US" altLang="zh-TW" sz="2000" dirty="0" smtClean="0">
               <a:latin typeface="Menlo Regular"/>
@@ -3564,56 +3590,6 @@
               </a:rPr>
               <a:t>.bold() </a:t>
             </a:r>
-            <a:endParaRPr kumimoji="1" lang="hu-HU" altLang="zh-TW" sz="2000" dirty="0" smtClean="0">
-              <a:latin typeface="Menlo Regular"/>
-              <a:cs typeface="Menlo Regular"/>
-            </a:endParaRPr>
-          </a:p>
-          <a:p>
-            <a:pPr marL="914400" lvl="2" indent="0">
-              <a:buNone/>
-            </a:pPr>
-            <a:r>
-              <a:rPr kumimoji="1" lang="en-US" altLang="zh-TW" sz="1600" dirty="0">
-                <a:latin typeface="Menlo Regular"/>
-                <a:cs typeface="Menlo Regular"/>
-              </a:rPr>
-              <a:t>-&gt; &lt;</a:t>
-            </a:r>
-            <a:r>
-              <a:rPr kumimoji="1" lang="en-US" altLang="zh-TW" sz="1600" dirty="0">
-                <a:solidFill>
-                  <a:srgbClr val="FF0000"/>
-                </a:solidFill>
-                <a:latin typeface="Menlo Regular"/>
-                <a:cs typeface="Menlo Regular"/>
-              </a:rPr>
-              <a:t>b</a:t>
-            </a:r>
-            <a:r>
-              <a:rPr kumimoji="1" lang="en-US" altLang="zh-TW" sz="1600" dirty="0">
-                <a:latin typeface="Menlo Regular"/>
-                <a:cs typeface="Menlo Regular"/>
-              </a:rPr>
-              <a:t>&gt;&lt;/</a:t>
-            </a:r>
-            <a:r>
-              <a:rPr kumimoji="1" lang="en-US" altLang="zh-TW" sz="1600" dirty="0">
-                <a:solidFill>
-                  <a:srgbClr val="FF0000"/>
-                </a:solidFill>
-                <a:latin typeface="Menlo Regular"/>
-                <a:cs typeface="Menlo Regular"/>
-              </a:rPr>
-              <a:t>b</a:t>
-            </a:r>
-            <a:r>
-              <a:rPr kumimoji="1" lang="en-US" altLang="zh-TW" sz="1600" dirty="0">
-                <a:latin typeface="Menlo Regular"/>
-                <a:cs typeface="Menlo Regular"/>
-              </a:rPr>
-              <a:t>&gt;</a:t>
-            </a:r>
             <a:endParaRPr kumimoji="1" lang="en-US" altLang="zh-TW" sz="1600" dirty="0" smtClean="0">
               <a:latin typeface="Menlo Regular"/>
               <a:cs typeface="Menlo Regular"/>
@@ -3655,7 +3631,49 @@
                 <a:latin typeface="Menlo Regular"/>
                 <a:cs typeface="Menlo Regular"/>
               </a:rPr>
-              <a:t>.input(String _name, String _type, String _value) </a:t>
+              <a:t>.input</a:t>
+            </a:r>
+            <a:r>
+              <a:rPr kumimoji="1" lang="en-US" altLang="zh-TW" sz="1600" dirty="0" smtClean="0">
+                <a:latin typeface="Menlo Regular"/>
+                <a:cs typeface="Menlo Regular"/>
+              </a:rPr>
+              <a:t>(_name</a:t>
+            </a:r>
+            <a:r>
+              <a:rPr kumimoji="1" lang="en-US" altLang="zh-TW" sz="1600" dirty="0">
+                <a:latin typeface="Menlo Regular"/>
+                <a:cs typeface="Menlo Regular"/>
+              </a:rPr>
+              <a:t>, </a:t>
+            </a:r>
+            <a:r>
+              <a:rPr kumimoji="1" lang="en-US" altLang="zh-TW" sz="1600" dirty="0" smtClean="0">
+                <a:latin typeface="Menlo Regular"/>
+                <a:cs typeface="Menlo Regular"/>
+              </a:rPr>
+              <a:t>_type</a:t>
+            </a:r>
+            <a:r>
+              <a:rPr kumimoji="1" lang="en-US" altLang="zh-TW" sz="1600" dirty="0">
+                <a:latin typeface="Menlo Regular"/>
+                <a:cs typeface="Menlo Regular"/>
+              </a:rPr>
+              <a:t>, </a:t>
+            </a:r>
+            <a:r>
+              <a:rPr kumimoji="1" lang="en-US" altLang="zh-TW" sz="1600" dirty="0" smtClean="0">
+                <a:latin typeface="Menlo Regular"/>
+                <a:cs typeface="Menlo Regular"/>
+              </a:rPr>
+              <a:t>_value</a:t>
+            </a:r>
+            <a:r>
+              <a:rPr kumimoji="1" lang="en-US" altLang="zh-TW" sz="1600" dirty="0">
+                <a:latin typeface="Menlo Regular"/>
+                <a:cs typeface="Menlo Regular"/>
+              </a:rPr>
+              <a:t>) </a:t>
             </a:r>
             <a:endParaRPr kumimoji="1" lang="en-US" altLang="zh-TW" sz="1600" dirty="0" smtClean="0">
               <a:latin typeface="Menlo Regular"/>
@@ -3753,10 +3771,31 @@
                 <a:latin typeface="Menlo Regular"/>
                 <a:cs typeface="Menlo Regular"/>
               </a:rPr>
-              <a:t>.select(String _name, Array _</a:t>
-            </a:r>
-            <a:r>
-              <a:rPr kumimoji="1" lang="en-US" altLang="zh-TW" sz="1600" dirty="0" err="1">
+              <a:t>.select</a:t>
+            </a:r>
+            <a:r>
+              <a:rPr kumimoji="1" lang="en-US" altLang="zh-TW" sz="1600" dirty="0" smtClean="0">
+                <a:latin typeface="Menlo Regular"/>
+                <a:cs typeface="Menlo Regular"/>
+              </a:rPr>
+              <a:t>(_name</a:t>
+            </a:r>
+            <a:r>
+              <a:rPr kumimoji="1" lang="en-US" altLang="zh-TW" sz="1600" dirty="0">
+                <a:latin typeface="Menlo Regular"/>
+                <a:cs typeface="Menlo Regular"/>
+              </a:rPr>
+              <a:t>, </a:t>
+            </a:r>
+            <a:r>
+              <a:rPr kumimoji="1" lang="en-US" altLang="zh-TW" sz="1600" dirty="0" smtClean="0">
+                <a:latin typeface="Menlo Regular"/>
+                <a:cs typeface="Menlo Regular"/>
+              </a:rPr>
+              <a:t>_</a:t>
+            </a:r>
+            <a:r>
+              <a:rPr kumimoji="1" lang="en-US" altLang="zh-TW" sz="1600" dirty="0" err="1" smtClean="0">
                 <a:latin typeface="Menlo Regular"/>
                 <a:cs typeface="Menlo Regular"/>
               </a:rPr>
@@ -3889,7 +3928,21 @@
                 <a:latin typeface="Menlo Regular"/>
                 <a:cs typeface="Menlo Regular"/>
               </a:rPr>
-              <a:t>.submit(String _value)</a:t>
+              <a:t>.submit</a:t>
+            </a:r>
+            <a:r>
+              <a:rPr kumimoji="1" lang="en-US" altLang="zh-TW" sz="1600" dirty="0" smtClean="0">
+                <a:latin typeface="Menlo Regular"/>
+                <a:cs typeface="Menlo Regular"/>
+              </a:rPr>
+              <a:t>(_value</a:t>
+            </a:r>
+            <a:r>
+              <a:rPr kumimoji="1" lang="en-US" altLang="zh-TW" sz="1600" dirty="0">
+                <a:latin typeface="Menlo Regular"/>
+                <a:cs typeface="Menlo Regular"/>
+              </a:rPr>
+              <a:t>)</a:t>
             </a:r>
           </a:p>
           <a:p>
@@ -4013,6 +4066,13 @@
   <p:clrMapOvr>
     <a:masterClrMapping/>
   </p:clrMapOvr>
+  <p:timing>
+    <p:tnLst>
+      <p:par>
+        <p:cTn xmlns:p14="http://schemas.microsoft.com/office/powerpoint/2010/main" id="1" dur="indefinite" restart="never" nodeType="tmRoot"/>
+      </p:par>
+    </p:tnLst>
+  </p:timing>
 </p:sld>
 </file>
 
@@ -4074,83 +4134,66 @@
           <a:lstStyle/>
           <a:p>
             <a:r>
-              <a:rPr kumimoji="1" lang="en-US" altLang="zh-TW" sz="2000" dirty="0" err="1">
-                <a:latin typeface="Menlo Regular"/>
-                <a:cs typeface="Menlo Regular"/>
-              </a:rPr>
-              <a:t>img</a:t>
-            </a:r>
-            <a:r>
-              <a:rPr kumimoji="1" lang="en-US" altLang="zh-TW" sz="2000" dirty="0">
-                <a:latin typeface="Menlo Regular"/>
-                <a:cs typeface="Menlo Regular"/>
-              </a:rPr>
-              <a:t>(String _</a:t>
-            </a:r>
-            <a:r>
-              <a:rPr kumimoji="1" lang="en-US" altLang="zh-TW" sz="2000" dirty="0" err="1">
-                <a:latin typeface="Menlo Regular"/>
-                <a:cs typeface="Menlo Regular"/>
-              </a:rPr>
-              <a:t>respitory</a:t>
+              <a:rPr kumimoji="1" lang="en-US" altLang="zh-TW" sz="2000" dirty="0" err="1" smtClean="0">
+                <a:latin typeface="Menlo Regular"/>
+                <a:cs typeface="Menlo Regular"/>
+              </a:rPr>
+              <a:t>Img</a:t>
             </a:r>
             <a:r>
               <a:rPr kumimoji="1" lang="en-US" altLang="zh-TW" sz="2000" dirty="0" smtClean="0">
                 <a:latin typeface="Menlo Regular"/>
                 <a:cs typeface="Menlo Regular"/>
               </a:rPr>
-              <a:t>)</a:t>
-            </a:r>
+              <a:t>(_path)</a:t>
+            </a:r>
+            <a:endParaRPr kumimoji="1" lang="en-US" altLang="zh-TW" sz="2000" dirty="0" smtClean="0">
+              <a:latin typeface="Menlo Regular"/>
+              <a:cs typeface="Menlo Regular"/>
+            </a:endParaRPr>
           </a:p>
           <a:p>
             <a:pPr lvl="1"/>
             <a:r>
+              <a:rPr kumimoji="1" lang="en-US" altLang="zh-TW" sz="1600" dirty="0" smtClean="0">
+                <a:latin typeface="Menlo Regular"/>
+                <a:cs typeface="Menlo Regular"/>
+              </a:rPr>
+              <a:t>_path </a:t>
+            </a:r>
+            <a:r>
               <a:rPr kumimoji="1" lang="en-US" altLang="zh-TW" sz="1600" dirty="0">
                 <a:latin typeface="Menlo Regular"/>
                 <a:cs typeface="Menlo Regular"/>
               </a:rPr>
-              <a:t>_</a:t>
+              <a:t>=&gt; the image source</a:t>
+            </a:r>
+          </a:p>
+          <a:p>
+            <a:pPr lvl="1"/>
+            <a:r>
+              <a:rPr kumimoji="1" lang="en-US" altLang="zh-TW" sz="1600" dirty="0" smtClean="0">
+                <a:latin typeface="Menlo Regular"/>
+                <a:cs typeface="Menlo Regular"/>
+              </a:rPr>
+              <a:t>.</a:t>
             </a:r>
             <a:r>
               <a:rPr kumimoji="1" lang="en-US" altLang="zh-TW" sz="1600" dirty="0" err="1">
                 <a:latin typeface="Menlo Regular"/>
                 <a:cs typeface="Menlo Regular"/>
               </a:rPr>
-              <a:t>respitory</a:t>
-            </a:r>
-            <a:r>
-              <a:rPr kumimoji="1" lang="en-US" altLang="zh-TW" sz="1600" dirty="0">
-                <a:latin typeface="Menlo Regular"/>
-                <a:cs typeface="Menlo Regular"/>
-              </a:rPr>
-              <a:t> =&gt; the image source</a:t>
-            </a:r>
-          </a:p>
-          <a:p>
-            <a:pPr lvl="1"/>
+              <a:t>url</a:t>
+            </a:r>
             <a:r>
               <a:rPr kumimoji="1" lang="en-US" altLang="zh-TW" sz="1600" dirty="0" smtClean="0">
                 <a:latin typeface="Menlo Regular"/>
                 <a:cs typeface="Menlo Regular"/>
               </a:rPr>
-              <a:t>.</a:t>
-            </a:r>
-            <a:r>
-              <a:rPr kumimoji="1" lang="en-US" altLang="zh-TW" sz="1600" dirty="0" err="1">
-                <a:latin typeface="Menlo Regular"/>
-                <a:cs typeface="Menlo Regular"/>
-              </a:rPr>
-              <a:t>url</a:t>
-            </a:r>
-            <a:r>
-              <a:rPr kumimoji="1" lang="en-US" altLang="zh-TW" sz="1600" dirty="0">
-                <a:latin typeface="Menlo Regular"/>
-                <a:cs typeface="Menlo Regular"/>
-              </a:rPr>
-              <a:t>(String _</a:t>
-            </a:r>
-            <a:r>
-              <a:rPr kumimoji="1" lang="en-US" altLang="zh-TW" sz="1600" dirty="0" err="1">
+              <a:t>(_</a:t>
+            </a:r>
+            <a:r>
+              <a:rPr kumimoji="1" lang="en-US" altLang="zh-TW" sz="1600" dirty="0" err="1" smtClean="0">
                 <a:latin typeface="Menlo Regular"/>
                 <a:cs typeface="Menlo Regular"/>
               </a:rPr>
@@ -4175,41 +4218,34 @@
                 <a:latin typeface="Menlo Regular"/>
                 <a:cs typeface="Menlo Regular"/>
               </a:rPr>
-              <a:t>.size(</a:t>
-            </a:r>
-            <a:r>
-              <a:rPr kumimoji="1" lang="en-US" altLang="zh-TW" sz="1600" dirty="0" err="1">
-                <a:latin typeface="Menlo Regular"/>
-                <a:cs typeface="Menlo Regular"/>
-              </a:rPr>
-              <a:t>int</a:t>
+              <a:t>.size</a:t>
+            </a:r>
+            <a:r>
+              <a:rPr kumimoji="1" lang="en-US" altLang="zh-TW" sz="1600" dirty="0" smtClean="0">
+                <a:latin typeface="Menlo Regular"/>
+                <a:cs typeface="Menlo Regular"/>
+              </a:rPr>
+              <a:t>(_width</a:t>
             </a:r>
             <a:r>
               <a:rPr kumimoji="1" lang="en-US" altLang="zh-TW" sz="1600" dirty="0">
                 <a:latin typeface="Menlo Regular"/>
                 <a:cs typeface="Menlo Regular"/>
               </a:rPr>
-              <a:t> _width, </a:t>
-            </a:r>
-            <a:r>
-              <a:rPr kumimoji="1" lang="en-US" altLang="zh-TW" sz="1600" dirty="0" err="1">
-                <a:latin typeface="Menlo Regular"/>
-                <a:cs typeface="Menlo Regular"/>
-              </a:rPr>
-              <a:t>int</a:t>
-            </a:r>
-            <a:r>
-              <a:rPr kumimoji="1" lang="en-US" altLang="zh-TW" sz="1600" dirty="0">
-                <a:latin typeface="Menlo Regular"/>
-                <a:cs typeface="Menlo Regular"/>
-              </a:rPr>
-              <a:t> _height</a:t>
+              <a:t>, </a:t>
             </a:r>
             <a:r>
               <a:rPr kumimoji="1" lang="en-US" altLang="zh-TW" sz="1600" dirty="0" smtClean="0">
                 <a:latin typeface="Menlo Regular"/>
                 <a:cs typeface="Menlo Regular"/>
               </a:rPr>
+              <a:t>_height</a:t>
+            </a:r>
+            <a:r>
+              <a:rPr kumimoji="1" lang="en-US" altLang="zh-TW" sz="1600" dirty="0" smtClean="0">
+                <a:latin typeface="Menlo Regular"/>
+                <a:cs typeface="Menlo Regular"/>
+              </a:rPr>
               <a:t>)</a:t>
             </a:r>
           </a:p>
@@ -4219,21 +4255,21 @@
                 <a:latin typeface="Menlo Regular"/>
                 <a:cs typeface="Menlo Regular"/>
               </a:rPr>
-              <a:t>.times(</a:t>
-            </a:r>
-            <a:r>
-              <a:rPr kumimoji="1" lang="en-US" altLang="zh-TW" sz="2000" dirty="0" err="1">
-                <a:latin typeface="Menlo Regular"/>
-                <a:cs typeface="Menlo Regular"/>
-              </a:rPr>
-              <a:t>int</a:t>
+              <a:t>.times</a:t>
+            </a:r>
+            <a:r>
+              <a:rPr kumimoji="1" lang="en-US" altLang="zh-TW" sz="2000" dirty="0" smtClean="0">
+                <a:latin typeface="Menlo Regular"/>
+                <a:cs typeface="Menlo Regular"/>
+              </a:rPr>
+              <a:t>(_count</a:t>
             </a:r>
             <a:r>
               <a:rPr kumimoji="1" lang="en-US" altLang="zh-TW" sz="2000" dirty="0">
                 <a:latin typeface="Menlo Regular"/>
                 <a:cs typeface="Menlo Regular"/>
               </a:rPr>
-              <a:t> _count) -&gt; do the loop _count times</a:t>
+              <a:t>) -&gt; do the loop _count times</a:t>
             </a:r>
           </a:p>
           <a:p>
@@ -4378,7 +4414,7 @@
           </a:p>
           <a:p>
             <a:r>
-              <a:rPr kumimoji="1" lang="en-US" altLang="zh-TW" sz="2000" smtClean="0">
+              <a:rPr kumimoji="1" lang="en-US" altLang="zh-TW" sz="2000" dirty="0" smtClean="0">
                 <a:latin typeface="Menlo Regular"/>
                 <a:cs typeface="Menlo Regular"/>
               </a:rPr>
@@ -4389,38 +4425,24 @@
                 <a:latin typeface="Menlo Regular"/>
                 <a:cs typeface="Menlo Regular"/>
               </a:rPr>
-              <a:t>times(</a:t>
-            </a:r>
-            <a:r>
-              <a:rPr kumimoji="1" lang="en-US" altLang="zh-TW" sz="2000" dirty="0" err="1">
-                <a:latin typeface="Menlo Regular"/>
-                <a:cs typeface="Menlo Regular"/>
-              </a:rPr>
-              <a:t>int</a:t>
+              <a:t>times</a:t>
+            </a:r>
+            <a:r>
+              <a:rPr kumimoji="1" lang="en-US" altLang="zh-TW" sz="2000" dirty="0" smtClean="0">
+                <a:latin typeface="Menlo Regular"/>
+                <a:cs typeface="Menlo Regular"/>
+              </a:rPr>
+              <a:t>(_count</a:t>
             </a:r>
             <a:r>
               <a:rPr kumimoji="1" lang="en-US" altLang="zh-TW" sz="2000" dirty="0">
                 <a:latin typeface="Menlo Regular"/>
                 <a:cs typeface="Menlo Regular"/>
               </a:rPr>
-              <a:t> _count, </a:t>
-            </a:r>
-            <a:r>
-              <a:rPr kumimoji="1" lang="en-US" altLang="zh-TW" sz="2000" dirty="0" err="1">
-                <a:latin typeface="Menlo Regular"/>
-                <a:cs typeface="Menlo Regular"/>
-              </a:rPr>
-              <a:t>int</a:t>
-            </a:r>
-            <a:r>
-              <a:rPr kumimoji="1" lang="en-US" altLang="zh-TW" sz="2000" dirty="0">
-                <a:latin typeface="Menlo Regular"/>
-                <a:cs typeface="Menlo Regular"/>
-              </a:rPr>
-              <a:t> </a:t>
-            </a:r>
-            <a:r>
-              <a:rPr kumimoji="1" lang="en-US" altLang="zh-TW" sz="2000" dirty="0" err="1">
+              <a:t>, </a:t>
+            </a:r>
+            <a:r>
+              <a:rPr kumimoji="1" lang="en-US" altLang="zh-TW" sz="2000" dirty="0" err="1" smtClean="0">
                 <a:latin typeface="Menlo Regular"/>
                 <a:cs typeface="Menlo Regular"/>
               </a:rPr>
@@ -4469,6 +4491,347 @@
   <p:clrMapOvr>
     <a:masterClrMapping/>
   </p:clrMapOvr>
+  <p:timing>
+    <p:tnLst>
+      <p:par>
+        <p:cTn xmlns:p14="http://schemas.microsoft.com/office/powerpoint/2010/main" id="1" dur="indefinite" restart="never" nodeType="tmRoot"/>
+      </p:par>
+    </p:tnLst>
+  </p:timing>
+</p:sld>
+</file>
+
+<file path=ppt/slides/slide6.xml><?xml version="1.0" encoding="utf-8"?>
+<p:sld xmlns:a="http://schemas.openxmlformats.org/drawingml/2006/main" xmlns:r="http://schemas.openxmlformats.org/officeDocument/2006/relationships" xmlns:p="http://schemas.openxmlformats.org/presentationml/2006/main">
+  <p:cSld>
+    <p:spTree>
+      <p:nvGrpSpPr>
+        <p:cNvPr id="1" name=""/>
+        <p:cNvGrpSpPr/>
+        <p:nvPr/>
+      </p:nvGrpSpPr>
+      <p:grpSpPr>
+        <a:xfrm>
+          <a:off x="0" y="0"/>
+          <a:ext cx="0" cy="0"/>
+          <a:chOff x="0" y="0"/>
+          <a:chExt cx="0" cy="0"/>
+        </a:xfrm>
+      </p:grpSpPr>
+      <p:sp>
+        <p:nvSpPr>
+          <p:cNvPr id="2" name="標題 1"/>
+          <p:cNvSpPr>
+            <a:spLocks noGrp="1"/>
+          </p:cNvSpPr>
+          <p:nvPr>
+            <p:ph type="title"/>
+          </p:nvPr>
+        </p:nvSpPr>
+        <p:spPr/>
+        <p:txBody>
+          <a:bodyPr/>
+          <a:lstStyle/>
+          <a:p>
+            <a:r>
+              <a:rPr kumimoji="1" lang="en-US" altLang="zh-TW" dirty="0" smtClean="0"/>
+              <a:t>Implement</a:t>
+            </a:r>
+            <a:endParaRPr kumimoji="1" lang="zh-TW" altLang="en-US" dirty="0"/>
+          </a:p>
+        </p:txBody>
+      </p:sp>
+      <p:sp>
+        <p:nvSpPr>
+          <p:cNvPr id="3" name="內容版面配置區 2"/>
+          <p:cNvSpPr>
+            <a:spLocks noGrp="1"/>
+          </p:cNvSpPr>
+          <p:nvPr>
+            <p:ph idx="1"/>
+          </p:nvPr>
+        </p:nvSpPr>
+        <p:spPr/>
+        <p:txBody>
+          <a:bodyPr>
+            <a:normAutofit fontScale="92500" lnSpcReduction="20000"/>
+          </a:bodyPr>
+          <a:lstStyle/>
+          <a:p>
+            <a:r>
+              <a:rPr kumimoji="1" lang="en-US" altLang="zh-TW" sz="2000" dirty="0" smtClean="0">
+                <a:latin typeface="Menlo Regular"/>
+                <a:cs typeface="Menlo Regular"/>
+              </a:rPr>
+              <a:t>Programming Language: Ruby</a:t>
+            </a:r>
+          </a:p>
+          <a:p>
+            <a:r>
+              <a:rPr kumimoji="1" lang="en-US" altLang="zh-TW" sz="2000" dirty="0" smtClean="0">
+                <a:latin typeface="Menlo Regular"/>
+                <a:cs typeface="Menlo Regular"/>
+              </a:rPr>
+              <a:t>Implement framework: </a:t>
+            </a:r>
+            <a:r>
+              <a:rPr kumimoji="1" lang="en-US" altLang="zh-TW" sz="2000" dirty="0" err="1" smtClean="0">
+                <a:latin typeface="Menlo Regular"/>
+                <a:cs typeface="Menlo Regular"/>
+              </a:rPr>
+              <a:t>racc</a:t>
+            </a:r>
+            <a:r>
+              <a:rPr kumimoji="1" lang="en-US" altLang="zh-TW" sz="2000" dirty="0" smtClean="0">
+                <a:latin typeface="Menlo Regular"/>
+                <a:cs typeface="Menlo Regular"/>
+              </a:rPr>
+              <a:t> </a:t>
+            </a:r>
+          </a:p>
+          <a:p>
+            <a:pPr lvl="1"/>
+            <a:r>
+              <a:rPr kumimoji="1" lang="en-US" altLang="zh-TW" sz="1600" dirty="0" smtClean="0">
+                <a:latin typeface="Menlo Regular"/>
+                <a:cs typeface="Menlo Regular"/>
+              </a:rPr>
+              <a:t>(a simple parser generator for Ruby)</a:t>
+            </a:r>
+          </a:p>
+          <a:p>
+            <a:pPr lvl="1"/>
+            <a:r>
+              <a:rPr kumimoji="1" lang="en-US" altLang="zh-TW" sz="1600" dirty="0">
+                <a:latin typeface="Menlo Regular"/>
+                <a:cs typeface="Menlo Regular"/>
+              </a:rPr>
+              <a:t>https://github.com/tenderlove/</a:t>
+            </a:r>
+            <a:r>
+              <a:rPr kumimoji="1" lang="en-US" altLang="zh-TW" sz="1600" dirty="0" smtClean="0">
+                <a:latin typeface="Menlo Regular"/>
+                <a:cs typeface="Menlo Regular"/>
+              </a:rPr>
+              <a:t>racc</a:t>
+            </a:r>
+            <a:endParaRPr kumimoji="1" lang="en-US" altLang="zh-TW" sz="2000" dirty="0">
+              <a:latin typeface="Menlo Regular"/>
+              <a:cs typeface="Menlo Regular"/>
+            </a:endParaRPr>
+          </a:p>
+          <a:p>
+            <a:r>
+              <a:rPr kumimoji="1" lang="en-US" altLang="zh-TW" sz="2000" dirty="0" smtClean="0">
+                <a:latin typeface="Menlo Regular"/>
+                <a:cs typeface="Menlo Regular"/>
+              </a:rPr>
+              <a:t>Base Components</a:t>
+            </a:r>
+          </a:p>
+          <a:p>
+            <a:pPr lvl="1"/>
+            <a:r>
+              <a:rPr kumimoji="1" lang="en-US" altLang="zh-TW" sz="1600" dirty="0" err="1" smtClean="0">
+                <a:latin typeface="Menlo Regular"/>
+                <a:cs typeface="Menlo Regular"/>
+              </a:rPr>
+              <a:t>Lexer.rb</a:t>
+            </a:r>
+            <a:endParaRPr kumimoji="1" lang="en-US" altLang="zh-TW" sz="1600" dirty="0" smtClean="0">
+              <a:latin typeface="Menlo Regular"/>
+              <a:cs typeface="Menlo Regular"/>
+            </a:endParaRPr>
+          </a:p>
+          <a:p>
+            <a:pPr lvl="1"/>
+            <a:r>
+              <a:rPr kumimoji="1" lang="en-US" altLang="zh-TW" sz="1600" dirty="0" err="1" smtClean="0">
+                <a:latin typeface="Menlo Regular"/>
+                <a:cs typeface="Menlo Regular"/>
+              </a:rPr>
+              <a:t>keywords.rb</a:t>
+            </a:r>
+            <a:endParaRPr kumimoji="1" lang="en-US" altLang="zh-TW" sz="1600" dirty="0" smtClean="0">
+              <a:latin typeface="Menlo Regular"/>
+              <a:cs typeface="Menlo Regular"/>
+            </a:endParaRPr>
+          </a:p>
+          <a:p>
+            <a:pPr lvl="1"/>
+            <a:r>
+              <a:rPr kumimoji="1" lang="en-US" altLang="zh-TW" sz="1600" dirty="0" err="1" smtClean="0">
+                <a:latin typeface="Menlo Regular"/>
+                <a:cs typeface="Menlo Regular"/>
+              </a:rPr>
+              <a:t>HTMLCreator.rb</a:t>
+            </a:r>
+            <a:endParaRPr kumimoji="1" lang="en-US" altLang="zh-TW" sz="1600" dirty="0" smtClean="0">
+              <a:latin typeface="Menlo Regular"/>
+              <a:cs typeface="Menlo Regular"/>
+            </a:endParaRPr>
+          </a:p>
+          <a:p>
+            <a:pPr lvl="1"/>
+            <a:r>
+              <a:rPr kumimoji="1" lang="en-US" altLang="zh-TW" sz="1600" dirty="0" err="1" smtClean="0">
+                <a:latin typeface="Menlo Regular"/>
+                <a:cs typeface="Menlo Regular"/>
+              </a:rPr>
+              <a:t>Z_language_parser.y</a:t>
+            </a:r>
+            <a:r>
+              <a:rPr kumimoji="1" lang="en-US" altLang="zh-TW" sz="1600" dirty="0" smtClean="0">
+                <a:latin typeface="Menlo Regular"/>
+                <a:cs typeface="Menlo Regular"/>
+              </a:rPr>
+              <a:t> (RACC Grammar)</a:t>
+            </a:r>
+          </a:p>
+          <a:p>
+            <a:r>
+              <a:rPr kumimoji="1" lang="en-US" altLang="zh-TW" sz="2000" dirty="0" smtClean="0">
+                <a:latin typeface="Menlo Regular"/>
+                <a:cs typeface="Menlo Regular"/>
+              </a:rPr>
+              <a:t>Additional Components</a:t>
+            </a:r>
+            <a:endParaRPr kumimoji="1" lang="en-US" altLang="zh-TW" sz="1600" dirty="0">
+              <a:latin typeface="Menlo Regular"/>
+              <a:cs typeface="Menlo Regular"/>
+            </a:endParaRPr>
+          </a:p>
+          <a:p>
+            <a:pPr lvl="1"/>
+            <a:r>
+              <a:rPr kumimoji="1" lang="en-US" altLang="zh-TW" sz="1600" dirty="0" err="1" smtClean="0">
+                <a:latin typeface="Menlo Regular"/>
+                <a:cs typeface="Menlo Regular"/>
+              </a:rPr>
+              <a:t>img.rb</a:t>
+            </a:r>
+            <a:endParaRPr kumimoji="1" lang="en-US" altLang="zh-TW" sz="1600" dirty="0">
+              <a:latin typeface="Menlo Regular"/>
+              <a:cs typeface="Menlo Regular"/>
+            </a:endParaRPr>
+          </a:p>
+          <a:p>
+            <a:pPr lvl="1"/>
+            <a:r>
+              <a:rPr kumimoji="1" lang="en-US" altLang="zh-TW" sz="1600" dirty="0" err="1" smtClean="0">
+                <a:latin typeface="Menlo Regular"/>
+                <a:cs typeface="Menlo Regular"/>
+              </a:rPr>
+              <a:t>text.rb</a:t>
+            </a:r>
+            <a:endParaRPr kumimoji="1" lang="en-US" altLang="zh-TW" sz="1600" dirty="0">
+              <a:latin typeface="Menlo Regular"/>
+              <a:cs typeface="Menlo Regular"/>
+            </a:endParaRPr>
+          </a:p>
+          <a:p>
+            <a:pPr lvl="1"/>
+            <a:r>
+              <a:rPr kumimoji="1" lang="en-US" altLang="zh-TW" sz="1600" dirty="0" err="1" smtClean="0">
+                <a:latin typeface="Menlo Regular"/>
+                <a:cs typeface="Menlo Regular"/>
+              </a:rPr>
+              <a:t>form.rb</a:t>
+            </a:r>
+            <a:endParaRPr kumimoji="1" lang="en-US" altLang="zh-TW" sz="1600" dirty="0">
+              <a:latin typeface="Menlo Regular"/>
+              <a:cs typeface="Menlo Regular"/>
+            </a:endParaRPr>
+          </a:p>
+          <a:p>
+            <a:pPr lvl="1"/>
+            <a:r>
+              <a:rPr kumimoji="1" lang="en-US" altLang="zh-TW" sz="1600" dirty="0" err="1" smtClean="0">
+                <a:latin typeface="Menlo Regular"/>
+                <a:cs typeface="Menlo Regular"/>
+              </a:rPr>
+              <a:t>input.rb</a:t>
+            </a:r>
+            <a:endParaRPr kumimoji="1" lang="en-US" altLang="zh-TW" sz="1600" dirty="0">
+              <a:latin typeface="Menlo Regular"/>
+              <a:cs typeface="Menlo Regular"/>
+            </a:endParaRPr>
+          </a:p>
+          <a:p>
+            <a:pPr lvl="1"/>
+            <a:r>
+              <a:rPr kumimoji="1" lang="en-US" altLang="zh-TW" sz="1600" dirty="0" err="1" smtClean="0">
+                <a:latin typeface="Menlo Regular"/>
+                <a:cs typeface="Menlo Regular"/>
+              </a:rPr>
+              <a:t>select.rb</a:t>
+            </a:r>
+            <a:endParaRPr kumimoji="1" lang="en-US" altLang="zh-TW" sz="1600" dirty="0">
+              <a:latin typeface="Menlo Regular"/>
+              <a:cs typeface="Menlo Regular"/>
+            </a:endParaRPr>
+          </a:p>
+          <a:p>
+            <a:pPr lvl="1"/>
+            <a:r>
+              <a:rPr kumimoji="1" lang="en-US" altLang="zh-TW" sz="1600" dirty="0" err="1" smtClean="0">
+                <a:latin typeface="Menlo Regular"/>
+                <a:cs typeface="Menlo Regular"/>
+              </a:rPr>
+              <a:t>newline.rb</a:t>
+            </a:r>
+            <a:endParaRPr kumimoji="1" lang="en-US" altLang="zh-TW" sz="1600" dirty="0">
+              <a:latin typeface="Menlo Regular"/>
+              <a:cs typeface="Menlo Regular"/>
+            </a:endParaRPr>
+          </a:p>
+          <a:p>
+            <a:pPr lvl="1"/>
+            <a:r>
+              <a:rPr kumimoji="1" lang="en-US" altLang="zh-TW" sz="1600" dirty="0" err="1" smtClean="0">
+                <a:latin typeface="Menlo Regular"/>
+                <a:cs typeface="Menlo Regular"/>
+              </a:rPr>
+              <a:t>function.rb</a:t>
+            </a:r>
+            <a:endParaRPr kumimoji="1" lang="en-US" altLang="zh-TW" sz="1600" dirty="0">
+              <a:latin typeface="Menlo Regular"/>
+              <a:cs typeface="Menlo Regular"/>
+            </a:endParaRPr>
+          </a:p>
+          <a:p>
+            <a:pPr lvl="1"/>
+            <a:r>
+              <a:rPr kumimoji="1" lang="en-US" altLang="zh-TW" sz="1600" dirty="0" err="1" smtClean="0">
+                <a:latin typeface="Menlo Regular"/>
+                <a:cs typeface="Menlo Regular"/>
+              </a:rPr>
+              <a:t>obj.rb</a:t>
+            </a:r>
+            <a:endParaRPr kumimoji="1" lang="en-US" altLang="zh-TW" sz="1600" dirty="0">
+              <a:latin typeface="Menlo Regular"/>
+              <a:cs typeface="Menlo Regular"/>
+            </a:endParaRPr>
+          </a:p>
+        </p:txBody>
+      </p:sp>
+    </p:spTree>
+    <p:extLst>
+      <p:ext uri="{BB962C8B-B14F-4D97-AF65-F5344CB8AC3E}">
+        <p14:creationId xmlns:p14="http://schemas.microsoft.com/office/powerpoint/2010/main" val="1804055645"/>
+      </p:ext>
+    </p:extLst>
+  </p:cSld>
+  <p:clrMapOvr>
+    <a:masterClrMapping/>
+  </p:clrMapOvr>
+  <p:timing>
+    <p:tnLst>
+      <p:par>
+        <p:cTn xmlns:p14="http://schemas.microsoft.com/office/powerpoint/2010/main" id="1" dur="indefinite" restart="never" nodeType="tmRoot"/>
+      </p:par>
+    </p:tnLst>
+  </p:timing>
 </p:sld>
 </file>
 

</xml_diff>

<commit_message>
add function in PPT and finish read & instruction!!
</commit_message>
<xml_diff>
--- a/document/Z-Language.pptx
+++ b/document/Z-Language.pptx
@@ -10,7 +10,8 @@
     <p:sldId id="258" r:id="rId4"/>
     <p:sldId id="259" r:id="rId5"/>
     <p:sldId id="260" r:id="rId6"/>
-    <p:sldId id="261" r:id="rId7"/>
+    <p:sldId id="262" r:id="rId7"/>
+    <p:sldId id="261" r:id="rId8"/>
   </p:sldIdLst>
   <p:sldSz cx="9144000" cy="6858000" type="screen4x3"/>
   <p:notesSz cx="6858000" cy="9144000"/>
@@ -4147,10 +4148,6 @@
               </a:rPr>
               <a:t>(_path)</a:t>
             </a:r>
-            <a:endParaRPr kumimoji="1" lang="en-US" altLang="zh-TW" sz="2000" dirty="0" smtClean="0">
-              <a:latin typeface="Menlo Regular"/>
-              <a:cs typeface="Menlo Regular"/>
-            </a:endParaRPr>
           </a:p>
           <a:p>
             <a:pPr lvl="1"/>
@@ -4239,14 +4236,7 @@
                 <a:latin typeface="Menlo Regular"/>
                 <a:cs typeface="Menlo Regular"/>
               </a:rPr>
-              <a:t>_height</a:t>
-            </a:r>
-            <a:r>
-              <a:rPr kumimoji="1" lang="en-US" altLang="zh-TW" sz="1600" dirty="0" smtClean="0">
-                <a:latin typeface="Menlo Regular"/>
-                <a:cs typeface="Menlo Regular"/>
-              </a:rPr>
-              <a:t>)</a:t>
+              <a:t>_height)</a:t>
             </a:r>
           </a:p>
           <a:p>
@@ -4502,6 +4492,256 @@
 </file>
 
 <file path=ppt/slides/slide6.xml><?xml version="1.0" encoding="utf-8"?>
+<p:sld xmlns:a="http://schemas.openxmlformats.org/drawingml/2006/main" xmlns:r="http://schemas.openxmlformats.org/officeDocument/2006/relationships" xmlns:p="http://schemas.openxmlformats.org/presentationml/2006/main">
+  <p:cSld>
+    <p:spTree>
+      <p:nvGrpSpPr>
+        <p:cNvPr id="1" name=""/>
+        <p:cNvGrpSpPr/>
+        <p:nvPr/>
+      </p:nvGrpSpPr>
+      <p:grpSpPr>
+        <a:xfrm>
+          <a:off x="0" y="0"/>
+          <a:ext cx="0" cy="0"/>
+          <a:chOff x="0" y="0"/>
+          <a:chExt cx="0" cy="0"/>
+        </a:xfrm>
+      </p:grpSpPr>
+      <p:sp>
+        <p:nvSpPr>
+          <p:cNvPr id="2" name="標題 1"/>
+          <p:cNvSpPr>
+            <a:spLocks noGrp="1"/>
+          </p:cNvSpPr>
+          <p:nvPr>
+            <p:ph type="title"/>
+          </p:nvPr>
+        </p:nvSpPr>
+        <p:spPr/>
+        <p:txBody>
+          <a:bodyPr/>
+          <a:lstStyle/>
+          <a:p>
+            <a:r>
+              <a:rPr kumimoji="1" lang="en-US" altLang="zh-TW" dirty="0" smtClean="0"/>
+              <a:t>Declare variables and functions</a:t>
+            </a:r>
+            <a:endParaRPr kumimoji="1" lang="zh-TW" altLang="en-US" dirty="0"/>
+          </a:p>
+        </p:txBody>
+      </p:sp>
+      <p:sp>
+        <p:nvSpPr>
+          <p:cNvPr id="3" name="內容版面配置區 2"/>
+          <p:cNvSpPr>
+            <a:spLocks noGrp="1"/>
+          </p:cNvSpPr>
+          <p:nvPr>
+            <p:ph idx="1"/>
+          </p:nvPr>
+        </p:nvSpPr>
+        <p:spPr/>
+        <p:txBody>
+          <a:bodyPr>
+            <a:normAutofit/>
+          </a:bodyPr>
+          <a:lstStyle/>
+          <a:p>
+            <a:r>
+              <a:rPr kumimoji="1" lang="en-US" altLang="zh-TW" sz="1600" dirty="0" smtClean="0">
+                <a:latin typeface="Menlo Regular"/>
+                <a:cs typeface="Menlo Regular"/>
+              </a:rPr>
+              <a:t>Variables</a:t>
+            </a:r>
+            <a:endParaRPr kumimoji="1" lang="en-US" altLang="zh-TW" sz="1600" dirty="0" smtClean="0">
+              <a:latin typeface="Menlo Regular"/>
+              <a:cs typeface="Menlo Regular"/>
+            </a:endParaRPr>
+          </a:p>
+          <a:p>
+            <a:pPr lvl="1"/>
+            <a:r>
+              <a:rPr kumimoji="1" lang="en-US" altLang="zh-TW" sz="1600" dirty="0" smtClean="0">
+                <a:latin typeface="Menlo Regular"/>
+                <a:cs typeface="Menlo Regular"/>
+              </a:rPr>
+              <a:t>Array</a:t>
+            </a:r>
+          </a:p>
+          <a:p>
+            <a:pPr lvl="2"/>
+            <a:r>
+              <a:rPr kumimoji="1" lang="en-US" altLang="zh-TW" sz="1600" dirty="0" smtClean="0">
+                <a:latin typeface="Menlo Regular"/>
+                <a:cs typeface="Menlo Regular"/>
+              </a:rPr>
+              <a:t>A = [1, 2, 3, 4, 5, 6]</a:t>
+            </a:r>
+            <a:endParaRPr kumimoji="1" lang="en-US" altLang="zh-TW" sz="1600" dirty="0">
+              <a:latin typeface="Menlo Regular"/>
+              <a:cs typeface="Menlo Regular"/>
+            </a:endParaRPr>
+          </a:p>
+          <a:p>
+            <a:pPr lvl="1"/>
+            <a:r>
+              <a:rPr kumimoji="1" lang="en-US" altLang="zh-TW" sz="1600" dirty="0" err="1" smtClean="0">
+                <a:latin typeface="Menlo Regular"/>
+                <a:cs typeface="Menlo Regular"/>
+              </a:rPr>
+              <a:t>int</a:t>
+            </a:r>
+            <a:endParaRPr kumimoji="1" lang="en-US" altLang="zh-TW" sz="1600" dirty="0" smtClean="0">
+              <a:latin typeface="Menlo Regular"/>
+              <a:cs typeface="Menlo Regular"/>
+            </a:endParaRPr>
+          </a:p>
+          <a:p>
+            <a:pPr lvl="2"/>
+            <a:r>
+              <a:rPr kumimoji="1" lang="en-US" altLang="zh-TW" sz="1600" dirty="0" err="1" smtClean="0">
+                <a:latin typeface="Menlo Regular"/>
+                <a:cs typeface="Menlo Regular"/>
+              </a:rPr>
+              <a:t>Var</a:t>
+            </a:r>
+            <a:r>
+              <a:rPr kumimoji="1" lang="en-US" altLang="zh-TW" sz="1600" dirty="0" smtClean="0">
+                <a:latin typeface="Menlo Regular"/>
+                <a:cs typeface="Menlo Regular"/>
+              </a:rPr>
+              <a:t> = 5</a:t>
+            </a:r>
+            <a:endParaRPr kumimoji="1" lang="en-US" altLang="zh-TW" sz="1600" dirty="0" smtClean="0">
+              <a:latin typeface="Menlo Regular"/>
+              <a:cs typeface="Menlo Regular"/>
+            </a:endParaRPr>
+          </a:p>
+          <a:p>
+            <a:r>
+              <a:rPr kumimoji="1" lang="en-US" altLang="zh-TW" sz="1600" dirty="0" smtClean="0">
+                <a:latin typeface="Menlo Regular"/>
+                <a:cs typeface="Menlo Regular"/>
+              </a:rPr>
+              <a:t>Functions</a:t>
+            </a:r>
+            <a:endParaRPr kumimoji="1" lang="en-US" altLang="zh-TW" sz="1600" dirty="0">
+              <a:latin typeface="Menlo Regular"/>
+              <a:cs typeface="Menlo Regular"/>
+            </a:endParaRPr>
+          </a:p>
+          <a:p>
+            <a:pPr marL="457200" lvl="1" indent="0">
+              <a:buNone/>
+            </a:pPr>
+            <a:r>
+              <a:rPr kumimoji="1" lang="en-US" altLang="zh-TW" sz="1600" dirty="0" err="1">
+                <a:latin typeface="Menlo Regular"/>
+                <a:cs typeface="Menlo Regular"/>
+              </a:rPr>
+              <a:t>def</a:t>
+            </a:r>
+            <a:r>
+              <a:rPr kumimoji="1" lang="en-US" altLang="zh-TW" sz="1600" dirty="0">
+                <a:latin typeface="Menlo Regular"/>
+                <a:cs typeface="Menlo Regular"/>
+              </a:rPr>
+              <a:t> </a:t>
+            </a:r>
+            <a:r>
+              <a:rPr kumimoji="1" lang="en-US" altLang="zh-TW" sz="1600" dirty="0" err="1">
+                <a:latin typeface="Menlo Regular"/>
+                <a:cs typeface="Menlo Regular"/>
+              </a:rPr>
+              <a:t>function_name</a:t>
+            </a:r>
+            <a:r>
+              <a:rPr kumimoji="1" lang="en-US" altLang="zh-TW" sz="1600" dirty="0">
+                <a:latin typeface="Menlo Regular"/>
+                <a:cs typeface="Menlo Regular"/>
+              </a:rPr>
+              <a:t>(_</a:t>
+            </a:r>
+            <a:r>
+              <a:rPr kumimoji="1" lang="en-US" altLang="zh-TW" sz="1600" dirty="0" err="1">
+                <a:latin typeface="Menlo Regular"/>
+                <a:cs typeface="Menlo Regular"/>
+              </a:rPr>
+              <a:t>var</a:t>
+            </a:r>
+            <a:r>
+              <a:rPr kumimoji="1" lang="en-US" altLang="zh-TW" sz="1600" dirty="0">
+                <a:latin typeface="Menlo Regular"/>
+                <a:cs typeface="Menlo Regular"/>
+              </a:rPr>
+              <a:t>)</a:t>
+            </a:r>
+          </a:p>
+          <a:p>
+            <a:pPr marL="457200" lvl="1" indent="0">
+              <a:buNone/>
+            </a:pPr>
+            <a:r>
+              <a:rPr kumimoji="1" lang="en-US" altLang="zh-TW" sz="1600" dirty="0">
+                <a:latin typeface="Menlo Regular"/>
+                <a:cs typeface="Menlo Regular"/>
+              </a:rPr>
+              <a:t>	###Implement your function here!!###</a:t>
+            </a:r>
+          </a:p>
+          <a:p>
+            <a:pPr marL="457200" lvl="1" indent="0">
+              <a:buNone/>
+            </a:pPr>
+            <a:r>
+              <a:rPr kumimoji="1" lang="en-US" altLang="zh-TW" sz="1600" dirty="0" smtClean="0">
+                <a:latin typeface="Menlo Regular"/>
+                <a:cs typeface="Menlo Regular"/>
+              </a:rPr>
+              <a:t>end</a:t>
+            </a:r>
+            <a:endParaRPr kumimoji="1" lang="en-US" altLang="zh-TW" sz="1600" dirty="0">
+              <a:latin typeface="Menlo Regular"/>
+              <a:cs typeface="Menlo Regular"/>
+            </a:endParaRPr>
+          </a:p>
+          <a:p>
+            <a:endParaRPr kumimoji="1" lang="en-US" altLang="zh-TW" sz="1600" dirty="0" smtClean="0">
+              <a:latin typeface="Menlo Regular"/>
+              <a:cs typeface="Menlo Regular"/>
+            </a:endParaRPr>
+          </a:p>
+          <a:p>
+            <a:endParaRPr kumimoji="1" lang="en-US" altLang="zh-TW" sz="1600" dirty="0" smtClean="0">
+              <a:latin typeface="Menlo Regular"/>
+              <a:cs typeface="Menlo Regular"/>
+            </a:endParaRPr>
+          </a:p>
+        </p:txBody>
+      </p:sp>
+    </p:spTree>
+    <p:extLst>
+      <p:ext uri="{BB962C8B-B14F-4D97-AF65-F5344CB8AC3E}">
+        <p14:creationId xmlns:p14="http://schemas.microsoft.com/office/powerpoint/2010/main" val="796957483"/>
+      </p:ext>
+    </p:extLst>
+  </p:cSld>
+  <p:clrMapOvr>
+    <a:masterClrMapping/>
+  </p:clrMapOvr>
+  <p:timing>
+    <p:tnLst>
+      <p:par>
+        <p:cTn xmlns:p14="http://schemas.microsoft.com/office/powerpoint/2010/main" id="1" dur="indefinite" restart="never" nodeType="tmRoot"/>
+      </p:par>
+    </p:tnLst>
+  </p:timing>
+</p:sld>
+</file>
+
+<file path=ppt/slides/slide7.xml><?xml version="1.0" encoding="utf-8"?>
 <p:sld xmlns:a="http://schemas.openxmlformats.org/drawingml/2006/main" xmlns:r="http://schemas.openxmlformats.org/officeDocument/2006/relationships" xmlns:p="http://schemas.openxmlformats.org/presentationml/2006/main">
   <p:cSld>
     <p:spTree>

</xml_diff>